<commit_message>
Update PROJECT_DC 전투 타입 컨셉 기획서.pptx
값 추가
</commit_message>
<xml_diff>
--- a/기획서/PROJECT_DC 전투 타입 컨셉 기획서.pptx
+++ b/기획서/PROJECT_DC 전투 타입 컨셉 기획서.pptx
@@ -5,7 +5,7 @@
     <p:sldMasterId id="2147483648" r:id="rId1"/>
   </p:sldMasterIdLst>
   <p:notesMasterIdLst>
-    <p:notesMasterId r:id="rId10"/>
+    <p:notesMasterId r:id="rId9"/>
   </p:notesMasterIdLst>
   <p:sldIdLst>
     <p:sldId id="256" r:id="rId2"/>
@@ -15,7 +15,6 @@
     <p:sldId id="260" r:id="rId6"/>
     <p:sldId id="261" r:id="rId7"/>
     <p:sldId id="262" r:id="rId8"/>
-    <p:sldId id="263" r:id="rId9"/>
   </p:sldIdLst>
   <p:sldSz cx="18288000" cy="10287000"/>
   <p:notesSz cx="10287000" cy="18288000"/>
@@ -215,7 +214,7 @@
           <a:p>
             <a:fld id="{1C9DDAD9-DBBF-4405-8D6D-09C7F9908910}" type="datetimeFigureOut">
               <a:rPr lang="ko-KR" altLang="en-US" smtClean="0"/>
-              <a:t>2022-10-14</a:t>
+              <a:t>2022-10-15</a:t>
             </a:fld>
             <a:endParaRPr lang="ko-KR" altLang="en-US"/>
           </a:p>
@@ -953,7 +952,19 @@
             </a:r>
             <a:r>
               <a:rPr lang="en-US" altLang="ko-KR" dirty="0"/>
-              <a:t>:</a:t>
+              <a:t>: ??, </a:t>
+            </a:r>
+            <a:r>
+              <a:rPr lang="ko-KR" altLang="en-US" dirty="0" err="1"/>
+              <a:t>에이펙스</a:t>
+            </a:r>
+            <a:r>
+              <a:rPr lang="ko-KR" altLang="en-US" dirty="0"/>
+              <a:t> 레전드 무기 </a:t>
+            </a:r>
+            <a:r>
+              <a:rPr lang="en-US" altLang="ko-KR" dirty="0"/>
+              <a:t>R-301</a:t>
             </a:r>
           </a:p>
           <a:p>
@@ -1067,7 +1078,7 @@
             </a:r>
             <a:r>
               <a:rPr lang="en-US" altLang="ko-KR" dirty="0"/>
-              <a:t>2077,</a:t>
+              <a:t>2077</a:t>
             </a:r>
           </a:p>
           <a:p>
@@ -1103,7 +1114,7 @@
             </a:r>
             <a:r>
               <a:rPr lang="en-US" altLang="ko-KR" dirty="0"/>
-              <a:t>), </a:t>
+              <a:t>)</a:t>
             </a:r>
             <a:endParaRPr lang="ko-KR" altLang="en-US" dirty="0"/>
           </a:p>
@@ -1324,7 +1335,7 @@
           <a:p>
             <a:fld id="{F8166F1F-CE9B-4651-A6AA-CD717754106B}" type="datetimeFigureOut">
               <a:rPr lang="en-US" smtClean="0"/>
-              <a:t>10/14/2022</a:t>
+              <a:t>10/15/2022</a:t>
             </a:fld>
             <a:endParaRPr lang="en-US"/>
           </a:p>
@@ -1487,7 +1498,7 @@
           <a:p>
             <a:fld id="{A76116CE-C4A3-4A05-B2D7-7C2E9A889C0F}" type="datetimeFigureOut">
               <a:rPr lang="en-US" smtClean="0"/>
-              <a:t>10/14/2022</a:t>
+              <a:t>10/15/2022</a:t>
             </a:fld>
             <a:endParaRPr lang="en-US"/>
           </a:p>
@@ -1660,7 +1671,7 @@
           <a:p>
             <a:fld id="{A76116CE-C4A3-4A05-B2D7-7C2E9A889C0F}" type="datetimeFigureOut">
               <a:rPr lang="en-US" smtClean="0"/>
-              <a:t>10/14/2022</a:t>
+              <a:t>10/15/2022</a:t>
             </a:fld>
             <a:endParaRPr lang="en-US"/>
           </a:p>
@@ -1825,7 +1836,7 @@
           <a:p>
             <a:fld id="{A76116CE-C4A3-4A05-B2D7-7C2E9A889C0F}" type="datetimeFigureOut">
               <a:rPr lang="en-US" smtClean="0"/>
-              <a:t>10/14/2022</a:t>
+              <a:t>10/15/2022</a:t>
             </a:fld>
             <a:endParaRPr lang="en-US"/>
           </a:p>
@@ -2065,7 +2076,7 @@
           <a:p>
             <a:fld id="{A76116CE-C4A3-4A05-B2D7-7C2E9A889C0F}" type="datetimeFigureOut">
               <a:rPr lang="en-US" smtClean="0"/>
-              <a:t>10/14/2022</a:t>
+              <a:t>10/15/2022</a:t>
             </a:fld>
             <a:endParaRPr lang="en-US"/>
           </a:p>
@@ -2345,7 +2356,7 @@
           <a:p>
             <a:fld id="{A76116CE-C4A3-4A05-B2D7-7C2E9A889C0F}" type="datetimeFigureOut">
               <a:rPr lang="en-US" smtClean="0"/>
-              <a:t>10/14/2022</a:t>
+              <a:t>10/15/2022</a:t>
             </a:fld>
             <a:endParaRPr lang="en-US"/>
           </a:p>
@@ -2759,7 +2770,7 @@
           <a:p>
             <a:fld id="{A76116CE-C4A3-4A05-B2D7-7C2E9A889C0F}" type="datetimeFigureOut">
               <a:rPr lang="en-US" smtClean="0"/>
-              <a:t>10/14/2022</a:t>
+              <a:t>10/15/2022</a:t>
             </a:fld>
             <a:endParaRPr lang="en-US"/>
           </a:p>
@@ -2871,7 +2882,7 @@
           <a:p>
             <a:fld id="{A76116CE-C4A3-4A05-B2D7-7C2E9A889C0F}" type="datetimeFigureOut">
               <a:rPr lang="en-US" smtClean="0"/>
-              <a:t>10/14/2022</a:t>
+              <a:t>10/15/2022</a:t>
             </a:fld>
             <a:endParaRPr lang="en-US"/>
           </a:p>
@@ -2961,7 +2972,7 @@
           <a:p>
             <a:fld id="{A76116CE-C4A3-4A05-B2D7-7C2E9A889C0F}" type="datetimeFigureOut">
               <a:rPr lang="en-US" smtClean="0"/>
-              <a:t>10/14/2022</a:t>
+              <a:t>10/15/2022</a:t>
             </a:fld>
             <a:endParaRPr lang="en-US"/>
           </a:p>
@@ -3231,7 +3242,7 @@
           <a:p>
             <a:fld id="{A76116CE-C4A3-4A05-B2D7-7C2E9A889C0F}" type="datetimeFigureOut">
               <a:rPr lang="en-US" smtClean="0"/>
-              <a:t>10/14/2022</a:t>
+              <a:t>10/15/2022</a:t>
             </a:fld>
             <a:endParaRPr lang="en-US"/>
           </a:p>
@@ -3478,7 +3489,7 @@
           <a:p>
             <a:fld id="{A76116CE-C4A3-4A05-B2D7-7C2E9A889C0F}" type="datetimeFigureOut">
               <a:rPr lang="en-US" smtClean="0"/>
-              <a:t>10/14/2022</a:t>
+              <a:t>10/15/2022</a:t>
             </a:fld>
             <a:endParaRPr lang="en-US"/>
           </a:p>
@@ -3684,7 +3695,7 @@
           <a:p>
             <a:fld id="{F8166F1F-CE9B-4651-A6AA-CD717754106B}" type="datetimeFigureOut">
               <a:rPr lang="en-US" smtClean="0"/>
-              <a:t>10/14/2022</a:t>
+              <a:t>10/15/2022</a:t>
             </a:fld>
             <a:endParaRPr lang="en-US"/>
           </a:p>
@@ -8169,7 +8180,7 @@
           <p:nvPr>
             <p:extLst>
               <p:ext uri="{D42A27DB-BD31-4B8C-83A1-F6EECF244321}">
-                <p14:modId xmlns:p14="http://schemas.microsoft.com/office/powerpoint/2010/main" val="1581451884"/>
+                <p14:modId xmlns:p14="http://schemas.microsoft.com/office/powerpoint/2010/main" val="2682661299"/>
               </p:ext>
             </p:extLst>
           </p:nvPr>
@@ -8731,7 +8742,46 @@
                           <a:latin typeface="Arial" panose="020B0604020202020204" pitchFamily="34" charset="0"/>
                           <a:cs typeface="Arial" panose="020B0604020202020204" pitchFamily="34" charset="0"/>
                         </a:rPr>
-                        <a:t>.</a:t>
+                        <a:t>. </a:t>
+                      </a:r>
+                      <a:r>
+                        <a:rPr lang="en-US" altLang="ko-KR" sz="1800" b="1" dirty="0">
+                          <a:solidFill>
+                            <a:schemeClr val="tx2">
+                              <a:lumMod val="60000"/>
+                              <a:lumOff val="40000"/>
+                            </a:schemeClr>
+                          </a:solidFill>
+                          <a:latin typeface="Arial" panose="020B0604020202020204" pitchFamily="34" charset="0"/>
+                          <a:cs typeface="Arial" panose="020B0604020202020204" pitchFamily="34" charset="0"/>
+                        </a:rPr>
+                        <a:t>(</a:t>
+                      </a:r>
+                      <a:r>
+                        <a:rPr lang="ko-KR" altLang="en-US" sz="1800" b="1" dirty="0">
+                          <a:solidFill>
+                            <a:schemeClr val="tx2">
+                              <a:lumMod val="60000"/>
+                              <a:lumOff val="40000"/>
+                            </a:schemeClr>
+                          </a:solidFill>
+                          <a:latin typeface="Arial" panose="020B0604020202020204" pitchFamily="34" charset="0"/>
+                          <a:cs typeface="Arial" panose="020B0604020202020204" pitchFamily="34" charset="0"/>
+                        </a:rPr>
+                        <a:t>여성의 경우 덩치를 심하게 부각할 필요는 없다</a:t>
+                      </a:r>
+                      <a:r>
+                        <a:rPr lang="en-US" altLang="ko-KR" sz="1800" b="1" dirty="0">
+                          <a:solidFill>
+                            <a:schemeClr val="tx2">
+                              <a:lumMod val="60000"/>
+                              <a:lumOff val="40000"/>
+                            </a:schemeClr>
+                          </a:solidFill>
+                          <a:latin typeface="Arial" panose="020B0604020202020204" pitchFamily="34" charset="0"/>
+                          <a:cs typeface="Arial" panose="020B0604020202020204" pitchFamily="34" charset="0"/>
+                        </a:rPr>
+                        <a:t>.)</a:t>
                       </a:r>
                     </a:p>
                     <a:p>
@@ -8751,7 +8801,7 @@
                           <a:latin typeface="Arial" panose="020B0604020202020204" pitchFamily="34" charset="0"/>
                           <a:cs typeface="Arial" panose="020B0604020202020204" pitchFamily="34" charset="0"/>
                         </a:rPr>
-                        <a:t>주로 두꺼운 옷을 입고 있다</a:t>
+                        <a:t>두꺼운 옷을 많이 입고 있으며 손과 발에 보호구를 차고 있는 경우도 있다</a:t>
                       </a:r>
                       <a:r>
                         <a:rPr lang="en-US" altLang="ko-KR" sz="1800" b="1" dirty="0">
@@ -8778,7 +8828,7 @@
                           <a:latin typeface="Arial" panose="020B0604020202020204" pitchFamily="34" charset="0"/>
                           <a:cs typeface="Arial" panose="020B0604020202020204" pitchFamily="34" charset="0"/>
                         </a:rPr>
-                        <a:t>몸과 얼굴에 상처가 있는 경우가 많다</a:t>
+                        <a:t>몸과 얼굴에 상처가 많다</a:t>
                       </a:r>
                       <a:r>
                         <a:rPr lang="en-US" altLang="ko-KR" sz="1800" b="1" dirty="0">
@@ -9957,7 +10007,7 @@
           <p:nvPr>
             <p:extLst>
               <p:ext uri="{D42A27DB-BD31-4B8C-83A1-F6EECF244321}">
-                <p14:modId xmlns:p14="http://schemas.microsoft.com/office/powerpoint/2010/main" val="3738698883"/>
+                <p14:modId xmlns:p14="http://schemas.microsoft.com/office/powerpoint/2010/main" val="2627414895"/>
               </p:ext>
             </p:extLst>
           </p:nvPr>
@@ -10520,7 +10570,10 @@
                       </a:r>
                     </a:p>
                     <a:p>
-                      <a:pPr algn="l" latinLnBrk="1"/>
+                      <a:pPr marL="0" indent="0" algn="l" latinLnBrk="1">
+                        <a:buFontTx/>
+                        <a:buNone/>
+                      </a:pPr>
                       <a:r>
                         <a:rPr lang="en-US" altLang="ko-KR" sz="1800" b="1" dirty="0">
                           <a:latin typeface="Arial" panose="020B0604020202020204" pitchFamily="34" charset="0"/>
@@ -10533,7 +10586,7 @@
                           <a:latin typeface="Arial" panose="020B0604020202020204" pitchFamily="34" charset="0"/>
                           <a:cs typeface="Arial" panose="020B0604020202020204" pitchFamily="34" charset="0"/>
                         </a:rPr>
-                        <a:t>얇은 옷 혹은 짧은 옷을 입는 경우가 많다</a:t>
+                        <a:t>옷이 얇으며 캐주얼한 옷을 입는 경우가 많다</a:t>
                       </a:r>
                       <a:r>
                         <a:rPr lang="en-US" altLang="ko-KR" sz="1800" b="1" dirty="0">
@@ -10556,11 +10609,18 @@
                         <a:t>- </a:t>
                       </a:r>
                       <a:r>
+                        <a:rPr lang="ko-KR" altLang="en-US" sz="1800" b="1" dirty="0" err="1">
+                          <a:latin typeface="Arial" panose="020B0604020202020204" pitchFamily="34" charset="0"/>
+                          <a:cs typeface="Arial" panose="020B0604020202020204" pitchFamily="34" charset="0"/>
+                        </a:rPr>
+                        <a:t>파쿠르를</a:t>
+                      </a:r>
+                      <a:r>
                         <a:rPr lang="ko-KR" altLang="en-US" sz="1800" b="1" dirty="0">
                           <a:latin typeface="Arial" panose="020B0604020202020204" pitchFamily="34" charset="0"/>
                           <a:cs typeface="Arial" panose="020B0604020202020204" pitchFamily="34" charset="0"/>
                         </a:rPr>
-                        <a:t>몸과 얼굴에 상처가 있는 경우가 약간 존재한다</a:t>
+                        <a:t> 하기 위해 운동화와 장갑을 끼고 있다</a:t>
                       </a:r>
                       <a:r>
                         <a:rPr lang="en-US" altLang="ko-KR" sz="1800" b="1" dirty="0">
@@ -10607,7 +10667,7 @@
                           <a:latin typeface="Arial" panose="020B0604020202020204" pitchFamily="34" charset="0"/>
                           <a:cs typeface="Arial" panose="020B0604020202020204" pitchFamily="34" charset="0"/>
                         </a:rPr>
-                        <a:t>-</a:t>
+                        <a:t>- </a:t>
                       </a:r>
                       <a:r>
                         <a:rPr lang="ko-KR" altLang="en-US" sz="1800" b="1" dirty="0">
@@ -11743,7 +11803,7 @@
           <p:nvPr>
             <p:extLst>
               <p:ext uri="{D42A27DB-BD31-4B8C-83A1-F6EECF244321}">
-                <p14:modId xmlns:p14="http://schemas.microsoft.com/office/powerpoint/2010/main" val="3170697943"/>
+                <p14:modId xmlns:p14="http://schemas.microsoft.com/office/powerpoint/2010/main" val="2534349457"/>
               </p:ext>
             </p:extLst>
           </p:nvPr>
@@ -12949,7 +13009,10 @@
                       </a:r>
                     </a:p>
                     <a:p>
-                      <a:pPr algn="l" latinLnBrk="1"/>
+                      <a:pPr marL="0" indent="0" algn="l" latinLnBrk="1">
+                        <a:buFontTx/>
+                        <a:buNone/>
+                      </a:pPr>
                       <a:r>
                         <a:rPr lang="en-US" altLang="ko-KR" sz="1800" b="1" dirty="0">
                           <a:latin typeface="Arial" panose="020B0604020202020204" pitchFamily="34" charset="0"/>
@@ -12977,6 +13040,47 @@
                           <a:cs typeface="Arial" panose="020B0604020202020204" pitchFamily="34" charset="0"/>
                         </a:rPr>
                         <a:t>장거리의 경우 무거운 무기로 큰 데미지를 준다</a:t>
+                      </a:r>
+                      <a:r>
+                        <a:rPr lang="en-US" altLang="ko-KR" sz="1800" b="1" dirty="0">
+                          <a:latin typeface="Arial" panose="020B0604020202020204" pitchFamily="34" charset="0"/>
+                          <a:cs typeface="Arial" panose="020B0604020202020204" pitchFamily="34" charset="0"/>
+                        </a:rPr>
+                        <a:t>.</a:t>
+                      </a:r>
+                    </a:p>
+                    <a:p>
+                      <a:pPr marL="0" indent="0" algn="l" latinLnBrk="1">
+                        <a:buFontTx/>
+                        <a:buNone/>
+                      </a:pPr>
+                      <a:r>
+                        <a:rPr lang="en-US" altLang="ko-KR" sz="1800" b="1" dirty="0">
+                          <a:latin typeface="Arial" panose="020B0604020202020204" pitchFamily="34" charset="0"/>
+                          <a:cs typeface="Arial" panose="020B0604020202020204" pitchFamily="34" charset="0"/>
+                        </a:rPr>
+                        <a:t>- </a:t>
+                      </a:r>
+                      <a:r>
+                        <a:rPr lang="ko-KR" altLang="en-US" sz="1800" b="1" dirty="0">
+                          <a:latin typeface="Arial" panose="020B0604020202020204" pitchFamily="34" charset="0"/>
+                          <a:cs typeface="Arial" panose="020B0604020202020204" pitchFamily="34" charset="0"/>
+                        </a:rPr>
+                        <a:t>기동성을 중심으로 전투하는 근</a:t>
+                      </a:r>
+                      <a:r>
+                        <a:rPr lang="en-US" altLang="ko-KR" sz="1800" b="1" dirty="0">
+                          <a:latin typeface="Arial" panose="020B0604020202020204" pitchFamily="34" charset="0"/>
+                          <a:cs typeface="Arial" panose="020B0604020202020204" pitchFamily="34" charset="0"/>
+                        </a:rPr>
+                        <a:t>,</a:t>
+                      </a:r>
+                      <a:r>
+                        <a:rPr lang="ko-KR" altLang="en-US" sz="1800" b="1" dirty="0">
+                          <a:latin typeface="Arial" panose="020B0604020202020204" pitchFamily="34" charset="0"/>
+                          <a:cs typeface="Arial" panose="020B0604020202020204" pitchFamily="34" charset="0"/>
+                        </a:rPr>
+                        <a:t>중거리의 경우 슬라이딩을 이용한 전투가 가능하다</a:t>
                       </a:r>
                       <a:r>
                         <a:rPr lang="en-US" altLang="ko-KR" sz="1800" b="1" dirty="0">
@@ -13557,7 +13661,7 @@
           <p:nvPr>
             <p:extLst>
               <p:ext uri="{D42A27DB-BD31-4B8C-83A1-F6EECF244321}">
-                <p14:modId xmlns:p14="http://schemas.microsoft.com/office/powerpoint/2010/main" val="883536634"/>
+                <p14:modId xmlns:p14="http://schemas.microsoft.com/office/powerpoint/2010/main" val="3256515428"/>
               </p:ext>
             </p:extLst>
           </p:nvPr>
@@ -14120,7 +14224,10 @@
                       </a:r>
                     </a:p>
                     <a:p>
-                      <a:pPr algn="l" latinLnBrk="1"/>
+                      <a:pPr marL="0" indent="0" algn="l" latinLnBrk="1">
+                        <a:buFontTx/>
+                        <a:buNone/>
+                      </a:pPr>
                       <a:r>
                         <a:rPr lang="en-US" altLang="ko-KR" sz="1800" b="1" dirty="0">
                           <a:latin typeface="Arial" panose="020B0604020202020204" pitchFamily="34" charset="0"/>
@@ -14134,6 +14241,61 @@
                           <a:cs typeface="Arial" panose="020B0604020202020204" pitchFamily="34" charset="0"/>
                         </a:rPr>
                         <a:t>옷은 주로 후드가 있는 옷을 입고 있으며 어두운 계열의 옷을 입는다</a:t>
+                      </a:r>
+                      <a:r>
+                        <a:rPr lang="en-US" altLang="ko-KR" sz="1800" b="1" dirty="0">
+                          <a:latin typeface="Arial" panose="020B0604020202020204" pitchFamily="34" charset="0"/>
+                          <a:cs typeface="Arial" panose="020B0604020202020204" pitchFamily="34" charset="0"/>
+                        </a:rPr>
+                        <a:t>.</a:t>
+                      </a:r>
+                    </a:p>
+                    <a:p>
+                      <a:pPr marL="0" indent="0" algn="l" latinLnBrk="1">
+                        <a:buFontTx/>
+                        <a:buNone/>
+                      </a:pPr>
+                      <a:r>
+                        <a:rPr lang="en-US" altLang="ko-KR" sz="1800" b="1" dirty="0">
+                          <a:latin typeface="Arial" panose="020B0604020202020204" pitchFamily="34" charset="0"/>
+                          <a:cs typeface="Arial" panose="020B0604020202020204" pitchFamily="34" charset="0"/>
+                        </a:rPr>
+                        <a:t>- </a:t>
+                      </a:r>
+                      <a:r>
+                        <a:rPr lang="ko-KR" altLang="en-US" sz="1800" b="1" dirty="0">
+                          <a:latin typeface="Arial" panose="020B0604020202020204" pitchFamily="34" charset="0"/>
+                          <a:cs typeface="Arial" panose="020B0604020202020204" pitchFamily="34" charset="0"/>
+                        </a:rPr>
+                        <a:t>간혹 </a:t>
+                      </a:r>
+                      <a:r>
+                        <a:rPr lang="ko-KR" altLang="en-US" sz="1800" b="1" dirty="0" err="1">
+                          <a:latin typeface="Arial" panose="020B0604020202020204" pitchFamily="34" charset="0"/>
+                          <a:cs typeface="Arial" panose="020B0604020202020204" pitchFamily="34" charset="0"/>
+                        </a:rPr>
+                        <a:t>드론을</a:t>
+                      </a:r>
+                      <a:r>
+                        <a:rPr lang="ko-KR" altLang="en-US" sz="1800" b="1" dirty="0">
+                          <a:latin typeface="Arial" panose="020B0604020202020204" pitchFamily="34" charset="0"/>
+                          <a:cs typeface="Arial" panose="020B0604020202020204" pitchFamily="34" charset="0"/>
+                        </a:rPr>
+                        <a:t> 들고 다니며 </a:t>
+                      </a:r>
+                      <a:r>
+                        <a:rPr lang="ko-KR" altLang="en-US" sz="1800" b="1" dirty="0" err="1">
+                          <a:latin typeface="Arial" panose="020B0604020202020204" pitchFamily="34" charset="0"/>
+                          <a:cs typeface="Arial" panose="020B0604020202020204" pitchFamily="34" charset="0"/>
+                        </a:rPr>
+                        <a:t>드론을</a:t>
+                      </a:r>
+                      <a:r>
+                        <a:rPr lang="ko-KR" altLang="en-US" sz="1800" b="1" dirty="0">
+                          <a:latin typeface="Arial" panose="020B0604020202020204" pitchFamily="34" charset="0"/>
+                          <a:cs typeface="Arial" panose="020B0604020202020204" pitchFamily="34" charset="0"/>
+                        </a:rPr>
+                        <a:t> 사용하는 사람도 있다</a:t>
                       </a:r>
                       <a:r>
                         <a:rPr lang="en-US" altLang="ko-KR" sz="1800" b="1" dirty="0">
@@ -14828,150 +14990,6 @@
           <a:xfrm>
             <a:off x="11210054" y="2765355"/>
             <a:ext cx="1609913" cy="2897843"/>
-          </a:xfrm>
-          <a:prstGeom prst="rect">
-            <a:avLst/>
-          </a:prstGeom>
-        </p:spPr>
-      </p:pic>
-    </p:spTree>
-  </p:cSld>
-  <p:clrMapOvr>
-    <a:masterClrMapping/>
-  </p:clrMapOvr>
-</p:sld>
-</file>
-
-<file path=ppt/slides/slide8.xml><?xml version="1.0" encoding="utf-8"?>
-<p:sld xmlns:a="http://schemas.openxmlformats.org/drawingml/2006/main" xmlns:r="http://schemas.openxmlformats.org/officeDocument/2006/relationships" xmlns:p="http://schemas.openxmlformats.org/presentationml/2006/main">
-  <p:cSld name="Slide 8">
-    <p:bg>
-      <p:bgPr>
-        <a:solidFill>
-          <a:srgbClr val="414755"/>
-        </a:solidFill>
-        <a:effectLst/>
-      </p:bgPr>
-    </p:bg>
-    <p:spTree>
-      <p:nvGrpSpPr>
-        <p:cNvPr id="1" name=""/>
-        <p:cNvGrpSpPr/>
-        <p:nvPr/>
-      </p:nvGrpSpPr>
-      <p:grpSpPr>
-        <a:xfrm>
-          <a:off x="0" y="0"/>
-          <a:ext cx="0" cy="0"/>
-          <a:chOff x="0" y="0"/>
-          <a:chExt cx="0" cy="0"/>
-        </a:xfrm>
-      </p:grpSpPr>
-      <p:pic>
-        <p:nvPicPr>
-          <p:cNvPr id="2" name="Object 1"/>
-          <p:cNvPicPr>
-            <a:picLocks noChangeAspect="1"/>
-          </p:cNvPicPr>
-          <p:nvPr/>
-        </p:nvPicPr>
-        <p:blipFill>
-          <a:blip r:embed="rId2" cstate="print"/>
-          <a:stretch>
-            <a:fillRect/>
-          </a:stretch>
-        </p:blipFill>
-        <p:spPr>
-          <a:xfrm>
-            <a:off x="5761315" y="5500626"/>
-            <a:ext cx="6853372" cy="824220"/>
-          </a:xfrm>
-          <a:prstGeom prst="rect">
-            <a:avLst/>
-          </a:prstGeom>
-        </p:spPr>
-      </p:pic>
-      <p:pic>
-        <p:nvPicPr>
-          <p:cNvPr id="3" name="Object 2"/>
-          <p:cNvPicPr>
-            <a:picLocks noChangeAspect="1"/>
-          </p:cNvPicPr>
-          <p:nvPr/>
-        </p:nvPicPr>
-        <p:blipFill>
-          <a:blip r:embed="rId3" cstate="print"/>
-          <a:stretch>
-            <a:fillRect/>
-          </a:stretch>
-        </p:blipFill>
-        <p:spPr>
-          <a:xfrm>
-            <a:off x="5105926" y="3817559"/>
-            <a:ext cx="7083294" cy="1850618"/>
-          </a:xfrm>
-          <a:prstGeom prst="rect">
-            <a:avLst/>
-          </a:prstGeom>
-        </p:spPr>
-      </p:pic>
-      <p:grpSp>
-        <p:nvGrpSpPr>
-          <p:cNvPr id="1001" name="그룹 1001"/>
-          <p:cNvGrpSpPr/>
-          <p:nvPr/>
-        </p:nvGrpSpPr>
-        <p:grpSpPr>
-          <a:xfrm>
-            <a:off x="-178631" y="9113043"/>
-            <a:ext cx="18589563" cy="1371429"/>
-            <a:chOff x="-178631" y="9113043"/>
-            <a:chExt cx="18589563" cy="1371429"/>
-          </a:xfrm>
-        </p:grpSpPr>
-        <p:pic>
-          <p:nvPicPr>
-            <p:cNvPr id="5" name="Object 4"/>
-            <p:cNvPicPr>
-              <a:picLocks noChangeAspect="1"/>
-            </p:cNvPicPr>
-            <p:nvPr/>
-          </p:nvPicPr>
-          <p:blipFill>
-            <a:blip r:embed="rId4" cstate="print"/>
-            <a:stretch>
-              <a:fillRect/>
-            </a:stretch>
-          </p:blipFill>
-          <p:spPr>
-            <a:xfrm>
-              <a:off x="-178631" y="9113043"/>
-              <a:ext cx="18589563" cy="1371429"/>
-            </a:xfrm>
-            <a:prstGeom prst="rect">
-              <a:avLst/>
-            </a:prstGeom>
-          </p:spPr>
-        </p:pic>
-      </p:grpSp>
-      <p:pic>
-        <p:nvPicPr>
-          <p:cNvPr id="7" name="Object 6"/>
-          <p:cNvPicPr>
-            <a:picLocks noChangeAspect="1"/>
-          </p:cNvPicPr>
-          <p:nvPr/>
-        </p:nvPicPr>
-        <p:blipFill>
-          <a:blip r:embed="rId5" cstate="print"/>
-          <a:stretch>
-            <a:fillRect/>
-          </a:stretch>
-        </p:blipFill>
-        <p:spPr>
-          <a:xfrm>
-            <a:off x="7042887" y="9478172"/>
-            <a:ext cx="2472663" cy="461463"/>
           </a:xfrm>
           <a:prstGeom prst="rect">
             <a:avLst/>

</xml_diff>